<commit_message>
tương tác với model rong khôgn gian chọn model trong không gian
</commit_message>
<xml_diff>
--- a/Report/slide report.pptx
+++ b/Report/slide report.pptx
@@ -12,6 +12,7 @@
     <p:sldId id="260" r:id="rId6"/>
     <p:sldId id="261" r:id="rId7"/>
     <p:sldId id="262" r:id="rId8"/>
+    <p:sldId id="263" r:id="rId9"/>
   </p:sldIdLst>
   <p:sldSz cx="9144000" cy="6858000" type="screen4x3"/>
   <p:notesSz cx="6858000" cy="9144000"/>
@@ -2849,7 +2850,7 @@
             <a:fld id="{1C5BA8D0-04A9-4324-80C8-68D45A5D7C85}" type="datetimeFigureOut">
               <a:rPr lang="en-US" smtClean="0"/>
               <a:pPr/>
-              <a:t>7/9/2011</a:t>
+              <a:t>7/14/2011</a:t>
             </a:fld>
             <a:endParaRPr lang="en-US"/>
           </a:p>
@@ -3016,7 +3017,7 @@
             <a:fld id="{1C5BA8D0-04A9-4324-80C8-68D45A5D7C85}" type="datetimeFigureOut">
               <a:rPr lang="en-US" smtClean="0"/>
               <a:pPr/>
-              <a:t>7/9/2011</a:t>
+              <a:t>7/14/2011</a:t>
             </a:fld>
             <a:endParaRPr lang="en-US"/>
           </a:p>
@@ -3193,7 +3194,7 @@
             <a:fld id="{1C5BA8D0-04A9-4324-80C8-68D45A5D7C85}" type="datetimeFigureOut">
               <a:rPr lang="en-US" smtClean="0"/>
               <a:pPr/>
-              <a:t>7/9/2011</a:t>
+              <a:t>7/14/2011</a:t>
             </a:fld>
             <a:endParaRPr lang="en-US"/>
           </a:p>
@@ -3360,7 +3361,7 @@
             <a:fld id="{1C5BA8D0-04A9-4324-80C8-68D45A5D7C85}" type="datetimeFigureOut">
               <a:rPr lang="en-US" smtClean="0"/>
               <a:pPr/>
-              <a:t>7/9/2011</a:t>
+              <a:t>7/14/2011</a:t>
             </a:fld>
             <a:endParaRPr lang="en-US"/>
           </a:p>
@@ -3603,7 +3604,7 @@
             <a:fld id="{1C5BA8D0-04A9-4324-80C8-68D45A5D7C85}" type="datetimeFigureOut">
               <a:rPr lang="en-US" smtClean="0"/>
               <a:pPr/>
-              <a:t>7/9/2011</a:t>
+              <a:t>7/14/2011</a:t>
             </a:fld>
             <a:endParaRPr lang="en-US"/>
           </a:p>
@@ -3888,7 +3889,7 @@
             <a:fld id="{1C5BA8D0-04A9-4324-80C8-68D45A5D7C85}" type="datetimeFigureOut">
               <a:rPr lang="en-US" smtClean="0"/>
               <a:pPr/>
-              <a:t>7/9/2011</a:t>
+              <a:t>7/14/2011</a:t>
             </a:fld>
             <a:endParaRPr lang="en-US"/>
           </a:p>
@@ -4307,7 +4308,7 @@
             <a:fld id="{1C5BA8D0-04A9-4324-80C8-68D45A5D7C85}" type="datetimeFigureOut">
               <a:rPr lang="en-US" smtClean="0"/>
               <a:pPr/>
-              <a:t>7/9/2011</a:t>
+              <a:t>7/14/2011</a:t>
             </a:fld>
             <a:endParaRPr lang="en-US"/>
           </a:p>
@@ -4422,7 +4423,7 @@
             <a:fld id="{1C5BA8D0-04A9-4324-80C8-68D45A5D7C85}" type="datetimeFigureOut">
               <a:rPr lang="en-US" smtClean="0"/>
               <a:pPr/>
-              <a:t>7/9/2011</a:t>
+              <a:t>7/14/2011</a:t>
             </a:fld>
             <a:endParaRPr lang="en-US"/>
           </a:p>
@@ -4514,7 +4515,7 @@
             <a:fld id="{1C5BA8D0-04A9-4324-80C8-68D45A5D7C85}" type="datetimeFigureOut">
               <a:rPr lang="en-US" smtClean="0"/>
               <a:pPr/>
-              <a:t>7/9/2011</a:t>
+              <a:t>7/14/2011</a:t>
             </a:fld>
             <a:endParaRPr lang="en-US"/>
           </a:p>
@@ -4788,7 +4789,7 @@
             <a:fld id="{1C5BA8D0-04A9-4324-80C8-68D45A5D7C85}" type="datetimeFigureOut">
               <a:rPr lang="en-US" smtClean="0"/>
               <a:pPr/>
-              <a:t>7/9/2011</a:t>
+              <a:t>7/14/2011</a:t>
             </a:fld>
             <a:endParaRPr lang="en-US"/>
           </a:p>
@@ -5038,7 +5039,7 @@
             <a:fld id="{1C5BA8D0-04A9-4324-80C8-68D45A5D7C85}" type="datetimeFigureOut">
               <a:rPr lang="en-US" smtClean="0"/>
               <a:pPr/>
-              <a:t>7/9/2011</a:t>
+              <a:t>7/14/2011</a:t>
             </a:fld>
             <a:endParaRPr lang="en-US"/>
           </a:p>
@@ -5248,7 +5249,7 @@
             <a:fld id="{1C5BA8D0-04A9-4324-80C8-68D45A5D7C85}" type="datetimeFigureOut">
               <a:rPr lang="en-US" smtClean="0"/>
               <a:pPr/>
-              <a:t>7/9/2011</a:t>
+              <a:t>7/14/2011</a:t>
             </a:fld>
             <a:endParaRPr lang="en-US"/>
           </a:p>
@@ -10653,6 +10654,650 @@
           </a:p>
         </p:txBody>
       </p:sp>
+    </p:spTree>
+  </p:cSld>
+  <p:clrMapOvr>
+    <a:masterClrMapping/>
+  </p:clrMapOvr>
+</p:sld>
+</file>
+
+<file path=ppt/slides/slide8.xml><?xml version="1.0" encoding="utf-8"?>
+<p:sld xmlns:a="http://schemas.openxmlformats.org/drawingml/2006/main" xmlns:r="http://schemas.openxmlformats.org/officeDocument/2006/relationships" xmlns:p="http://schemas.openxmlformats.org/presentationml/2006/main">
+  <p:cSld>
+    <p:spTree>
+      <p:nvGrpSpPr>
+        <p:cNvPr id="1" name=""/>
+        <p:cNvGrpSpPr/>
+        <p:nvPr/>
+      </p:nvGrpSpPr>
+      <p:grpSpPr>
+        <a:xfrm>
+          <a:off x="0" y="0"/>
+          <a:ext cx="0" cy="0"/>
+          <a:chOff x="0" y="0"/>
+          <a:chExt cx="0" cy="0"/>
+        </a:xfrm>
+      </p:grpSpPr>
+      <p:sp>
+        <p:nvSpPr>
+          <p:cNvPr id="69" name="Cube 68"/>
+          <p:cNvSpPr/>
+          <p:nvPr/>
+        </p:nvSpPr>
+        <p:spPr>
+          <a:xfrm rot="1795075">
+            <a:off x="6126826" y="2193391"/>
+            <a:ext cx="1039771" cy="706978"/>
+          </a:xfrm>
+          <a:prstGeom prst="cube">
+            <a:avLst/>
+          </a:prstGeom>
+        </p:spPr>
+        <p:style>
+          <a:lnRef idx="2">
+            <a:schemeClr val="accent1"/>
+          </a:lnRef>
+          <a:fillRef idx="1">
+            <a:schemeClr val="lt1"/>
+          </a:fillRef>
+          <a:effectRef idx="0">
+            <a:schemeClr val="accent1"/>
+          </a:effectRef>
+          <a:fontRef idx="minor">
+            <a:schemeClr val="dk1"/>
+          </a:fontRef>
+        </p:style>
+        <p:txBody>
+          <a:bodyPr rtlCol="0" anchor="ctr"/>
+          <a:lstStyle/>
+          <a:p>
+            <a:pPr algn="ctr"/>
+            <a:endParaRPr lang="en-US"/>
+          </a:p>
+        </p:txBody>
+      </p:sp>
+      <p:cxnSp>
+        <p:nvCxnSpPr>
+          <p:cNvPr id="11" name="Straight Connector 10"/>
+          <p:cNvCxnSpPr/>
+          <p:nvPr/>
+        </p:nvCxnSpPr>
+        <p:spPr>
+          <a:xfrm flipV="1">
+            <a:off x="1144718" y="2971800"/>
+            <a:ext cx="7237282" cy="2438401"/>
+          </a:xfrm>
+          <a:prstGeom prst="line">
+            <a:avLst/>
+          </a:prstGeom>
+          <a:ln>
+            <a:headEnd type="none" w="med" len="med"/>
+            <a:tailEnd type="arrow" w="med" len="med"/>
+          </a:ln>
+        </p:spPr>
+        <p:style>
+          <a:lnRef idx="2">
+            <a:schemeClr val="dk1"/>
+          </a:lnRef>
+          <a:fillRef idx="0">
+            <a:schemeClr val="dk1"/>
+          </a:fillRef>
+          <a:effectRef idx="1">
+            <a:schemeClr val="dk1"/>
+          </a:effectRef>
+          <a:fontRef idx="minor">
+            <a:schemeClr val="tx1"/>
+          </a:fontRef>
+        </p:style>
+      </p:cxnSp>
+      <p:sp>
+        <p:nvSpPr>
+          <p:cNvPr id="55" name="Oval 54"/>
+          <p:cNvSpPr/>
+          <p:nvPr/>
+        </p:nvSpPr>
+        <p:spPr>
+          <a:xfrm>
+            <a:off x="4954718" y="4038601"/>
+            <a:ext cx="152400" cy="152400"/>
+          </a:xfrm>
+          <a:prstGeom prst="ellipse">
+            <a:avLst/>
+          </a:prstGeom>
+        </p:spPr>
+        <p:style>
+          <a:lnRef idx="2">
+            <a:schemeClr val="dk1">
+              <a:shade val="50000"/>
+            </a:schemeClr>
+          </a:lnRef>
+          <a:fillRef idx="1">
+            <a:schemeClr val="dk1"/>
+          </a:fillRef>
+          <a:effectRef idx="0">
+            <a:schemeClr val="dk1"/>
+          </a:effectRef>
+          <a:fontRef idx="minor">
+            <a:schemeClr val="lt1"/>
+          </a:fontRef>
+        </p:style>
+        <p:txBody>
+          <a:bodyPr rtlCol="0" anchor="ctr"/>
+          <a:lstStyle/>
+          <a:p>
+            <a:pPr algn="ctr"/>
+            <a:endParaRPr lang="en-US"/>
+          </a:p>
+        </p:txBody>
+      </p:sp>
+      <p:sp>
+        <p:nvSpPr>
+          <p:cNvPr id="4" name="Parallelogram 3"/>
+          <p:cNvSpPr/>
+          <p:nvPr/>
+        </p:nvSpPr>
+        <p:spPr>
+          <a:xfrm rot="1106738" flipV="1">
+            <a:off x="2770485" y="2461553"/>
+            <a:ext cx="2893578" cy="2087296"/>
+          </a:xfrm>
+          <a:prstGeom prst="parallelogram">
+            <a:avLst>
+              <a:gd name="adj" fmla="val 17269"/>
+            </a:avLst>
+          </a:prstGeom>
+          <a:noFill/>
+        </p:spPr>
+        <p:style>
+          <a:lnRef idx="2">
+            <a:schemeClr val="accent1">
+              <a:shade val="50000"/>
+            </a:schemeClr>
+          </a:lnRef>
+          <a:fillRef idx="1">
+            <a:schemeClr val="accent1"/>
+          </a:fillRef>
+          <a:effectRef idx="0">
+            <a:schemeClr val="accent1"/>
+          </a:effectRef>
+          <a:fontRef idx="minor">
+            <a:schemeClr val="lt1"/>
+          </a:fontRef>
+        </p:style>
+        <p:txBody>
+          <a:bodyPr rtlCol="0" anchor="ctr"/>
+          <a:lstStyle/>
+          <a:p>
+            <a:pPr algn="ctr"/>
+            <a:endParaRPr lang="en-US"/>
+          </a:p>
+        </p:txBody>
+      </p:sp>
+      <p:sp>
+        <p:nvSpPr>
+          <p:cNvPr id="63" name="Oval 62"/>
+          <p:cNvSpPr/>
+          <p:nvPr/>
+        </p:nvSpPr>
+        <p:spPr>
+          <a:xfrm>
+            <a:off x="1124790" y="5291797"/>
+            <a:ext cx="152400" cy="152400"/>
+          </a:xfrm>
+          <a:prstGeom prst="ellipse">
+            <a:avLst/>
+          </a:prstGeom>
+        </p:spPr>
+        <p:style>
+          <a:lnRef idx="2">
+            <a:schemeClr val="dk1">
+              <a:shade val="50000"/>
+            </a:schemeClr>
+          </a:lnRef>
+          <a:fillRef idx="1">
+            <a:schemeClr val="dk1"/>
+          </a:fillRef>
+          <a:effectRef idx="0">
+            <a:schemeClr val="dk1"/>
+          </a:effectRef>
+          <a:fontRef idx="minor">
+            <a:schemeClr val="lt1"/>
+          </a:fontRef>
+        </p:style>
+        <p:txBody>
+          <a:bodyPr rtlCol="0" anchor="ctr"/>
+          <a:lstStyle/>
+          <a:p>
+            <a:pPr algn="ctr"/>
+            <a:endParaRPr lang="en-US"/>
+          </a:p>
+        </p:txBody>
+      </p:sp>
+      <p:sp>
+        <p:nvSpPr>
+          <p:cNvPr id="79" name="TextBox 78"/>
+          <p:cNvSpPr txBox="1"/>
+          <p:nvPr/>
+        </p:nvSpPr>
+        <p:spPr>
+          <a:xfrm>
+            <a:off x="306518" y="5486401"/>
+            <a:ext cx="1709379" cy="369332"/>
+          </a:xfrm>
+          <a:prstGeom prst="rect">
+            <a:avLst/>
+          </a:prstGeom>
+          <a:noFill/>
+        </p:spPr>
+        <p:txBody>
+          <a:bodyPr wrap="none" rtlCol="0">
+            <a:spAutoFit/>
+          </a:bodyPr>
+          <a:lstStyle/>
+          <a:p>
+            <a:r>
+              <a:rPr lang="en-US" smtClean="0"/>
+              <a:t>Camera Position</a:t>
+            </a:r>
+            <a:endParaRPr lang="en-US"/>
+          </a:p>
+        </p:txBody>
+      </p:sp>
+      <p:sp>
+        <p:nvSpPr>
+          <p:cNvPr id="83" name="TextBox 82"/>
+          <p:cNvSpPr txBox="1"/>
+          <p:nvPr/>
+        </p:nvSpPr>
+        <p:spPr>
+          <a:xfrm>
+            <a:off x="992318" y="5181601"/>
+            <a:ext cx="308098" cy="369332"/>
+          </a:xfrm>
+          <a:prstGeom prst="rect">
+            <a:avLst/>
+          </a:prstGeom>
+          <a:noFill/>
+        </p:spPr>
+        <p:txBody>
+          <a:bodyPr wrap="none" rtlCol="0">
+            <a:spAutoFit/>
+          </a:bodyPr>
+          <a:lstStyle/>
+          <a:p>
+            <a:r>
+              <a:rPr lang="en-US" smtClean="0"/>
+              <a:t>C</a:t>
+            </a:r>
+            <a:endParaRPr lang="en-US"/>
+          </a:p>
+        </p:txBody>
+      </p:sp>
+      <p:cxnSp>
+        <p:nvCxnSpPr>
+          <p:cNvPr id="45" name="Straight Connector 44"/>
+          <p:cNvCxnSpPr/>
+          <p:nvPr/>
+        </p:nvCxnSpPr>
+        <p:spPr>
+          <a:xfrm rot="5400000" flipH="1" flipV="1">
+            <a:off x="497018" y="2705101"/>
+            <a:ext cx="3352800" cy="2057400"/>
+          </a:xfrm>
+          <a:prstGeom prst="line">
+            <a:avLst/>
+          </a:prstGeom>
+        </p:spPr>
+        <p:style>
+          <a:lnRef idx="1">
+            <a:schemeClr val="accent1"/>
+          </a:lnRef>
+          <a:fillRef idx="0">
+            <a:schemeClr val="accent1"/>
+          </a:fillRef>
+          <a:effectRef idx="0">
+            <a:schemeClr val="accent1"/>
+          </a:effectRef>
+          <a:fontRef idx="minor">
+            <a:schemeClr val="tx1"/>
+          </a:fontRef>
+        </p:style>
+      </p:cxnSp>
+      <p:cxnSp>
+        <p:nvCxnSpPr>
+          <p:cNvPr id="47" name="Straight Connector 46"/>
+          <p:cNvCxnSpPr/>
+          <p:nvPr/>
+        </p:nvCxnSpPr>
+        <p:spPr>
+          <a:xfrm flipV="1">
+            <a:off x="1158786" y="4142937"/>
+            <a:ext cx="1676400" cy="1219200"/>
+          </a:xfrm>
+          <a:prstGeom prst="line">
+            <a:avLst/>
+          </a:prstGeom>
+        </p:spPr>
+        <p:style>
+          <a:lnRef idx="1">
+            <a:schemeClr val="accent1"/>
+          </a:lnRef>
+          <a:fillRef idx="0">
+            <a:schemeClr val="accent1"/>
+          </a:fillRef>
+          <a:effectRef idx="0">
+            <a:schemeClr val="accent1"/>
+          </a:effectRef>
+          <a:fontRef idx="minor">
+            <a:schemeClr val="tx1"/>
+          </a:fontRef>
+        </p:style>
+      </p:cxnSp>
+      <p:cxnSp>
+        <p:nvCxnSpPr>
+          <p:cNvPr id="49" name="Straight Connector 48"/>
+          <p:cNvCxnSpPr/>
+          <p:nvPr/>
+        </p:nvCxnSpPr>
+        <p:spPr>
+          <a:xfrm flipV="1">
+            <a:off x="1158786" y="2853397"/>
+            <a:ext cx="4419600" cy="2514600"/>
+          </a:xfrm>
+          <a:prstGeom prst="line">
+            <a:avLst/>
+          </a:prstGeom>
+        </p:spPr>
+        <p:style>
+          <a:lnRef idx="1">
+            <a:schemeClr val="accent1"/>
+          </a:lnRef>
+          <a:fillRef idx="0">
+            <a:schemeClr val="accent1"/>
+          </a:fillRef>
+          <a:effectRef idx="0">
+            <a:schemeClr val="accent1"/>
+          </a:effectRef>
+          <a:fontRef idx="minor">
+            <a:schemeClr val="tx1"/>
+          </a:fontRef>
+        </p:style>
+      </p:cxnSp>
+      <p:cxnSp>
+        <p:nvCxnSpPr>
+          <p:cNvPr id="51" name="Straight Connector 50"/>
+          <p:cNvCxnSpPr/>
+          <p:nvPr/>
+        </p:nvCxnSpPr>
+        <p:spPr>
+          <a:xfrm flipV="1">
+            <a:off x="1144718" y="4953001"/>
+            <a:ext cx="4114800" cy="457200"/>
+          </a:xfrm>
+          <a:prstGeom prst="line">
+            <a:avLst/>
+          </a:prstGeom>
+        </p:spPr>
+        <p:style>
+          <a:lnRef idx="1">
+            <a:schemeClr val="accent1"/>
+          </a:lnRef>
+          <a:fillRef idx="0">
+            <a:schemeClr val="accent1"/>
+          </a:fillRef>
+          <a:effectRef idx="0">
+            <a:schemeClr val="accent1"/>
+          </a:effectRef>
+          <a:fontRef idx="minor">
+            <a:schemeClr val="tx1"/>
+          </a:fontRef>
+        </p:style>
+      </p:cxnSp>
+      <p:sp>
+        <p:nvSpPr>
+          <p:cNvPr id="54" name="TextBox 53"/>
+          <p:cNvSpPr txBox="1"/>
+          <p:nvPr/>
+        </p:nvSpPr>
+        <p:spPr>
+          <a:xfrm>
+            <a:off x="8001000" y="3124200"/>
+            <a:ext cx="520207" cy="369332"/>
+          </a:xfrm>
+          <a:prstGeom prst="rect">
+            <a:avLst/>
+          </a:prstGeom>
+          <a:noFill/>
+        </p:spPr>
+        <p:txBody>
+          <a:bodyPr wrap="none" rtlCol="0">
+            <a:spAutoFit/>
+          </a:bodyPr>
+          <a:lstStyle/>
+          <a:p>
+            <a:r>
+              <a:rPr lang="en-US" smtClean="0"/>
+              <a:t>Ray</a:t>
+            </a:r>
+            <a:endParaRPr lang="en-US"/>
+          </a:p>
+        </p:txBody>
+      </p:sp>
+      <p:sp>
+        <p:nvSpPr>
+          <p:cNvPr id="66" name="TextBox 65"/>
+          <p:cNvSpPr txBox="1"/>
+          <p:nvPr/>
+        </p:nvSpPr>
+        <p:spPr>
+          <a:xfrm>
+            <a:off x="4497518" y="4267201"/>
+            <a:ext cx="2119683" cy="369332"/>
+          </a:xfrm>
+          <a:prstGeom prst="rect">
+            <a:avLst/>
+          </a:prstGeom>
+          <a:noFill/>
+        </p:spPr>
+        <p:txBody>
+          <a:bodyPr wrap="none" rtlCol="0">
+            <a:spAutoFit/>
+          </a:bodyPr>
+          <a:lstStyle/>
+          <a:p>
+            <a:r>
+              <a:rPr lang="en-US" smtClean="0"/>
+              <a:t>Mouse Click Position</a:t>
+            </a:r>
+            <a:endParaRPr lang="en-US"/>
+          </a:p>
+        </p:txBody>
+      </p:sp>
+      <p:sp>
+        <p:nvSpPr>
+          <p:cNvPr id="68" name="Cube 67"/>
+          <p:cNvSpPr/>
+          <p:nvPr/>
+        </p:nvSpPr>
+        <p:spPr>
+          <a:xfrm>
+            <a:off x="5638800" y="3048000"/>
+            <a:ext cx="1143000" cy="1143000"/>
+          </a:xfrm>
+          <a:prstGeom prst="cube">
+            <a:avLst/>
+          </a:prstGeom>
+          <a:effectLst>
+            <a:glow rad="139700">
+              <a:schemeClr val="accent2">
+                <a:satMod val="175000"/>
+                <a:alpha val="40000"/>
+              </a:schemeClr>
+            </a:glow>
+          </a:effectLst>
+        </p:spPr>
+        <p:style>
+          <a:lnRef idx="2">
+            <a:schemeClr val="accent2"/>
+          </a:lnRef>
+          <a:fillRef idx="1">
+            <a:schemeClr val="lt1"/>
+          </a:fillRef>
+          <a:effectRef idx="0">
+            <a:schemeClr val="accent2"/>
+          </a:effectRef>
+          <a:fontRef idx="minor">
+            <a:schemeClr val="dk1"/>
+          </a:fontRef>
+        </p:style>
+        <p:txBody>
+          <a:bodyPr rtlCol="0" anchor="ctr"/>
+          <a:lstStyle/>
+          <a:p>
+            <a:pPr algn="ctr"/>
+            <a:endParaRPr lang="en-US"/>
+          </a:p>
+        </p:txBody>
+      </p:sp>
+      <p:sp>
+        <p:nvSpPr>
+          <p:cNvPr id="67" name="TextBox 66"/>
+          <p:cNvSpPr txBox="1"/>
+          <p:nvPr/>
+        </p:nvSpPr>
+        <p:spPr>
+          <a:xfrm>
+            <a:off x="4040318" y="2057401"/>
+            <a:ext cx="1335302" cy="369332"/>
+          </a:xfrm>
+          <a:prstGeom prst="rect">
+            <a:avLst/>
+          </a:prstGeom>
+          <a:noFill/>
+        </p:spPr>
+        <p:txBody>
+          <a:bodyPr wrap="none" rtlCol="0">
+            <a:spAutoFit/>
+          </a:bodyPr>
+          <a:lstStyle/>
+          <a:p>
+            <a:r>
+              <a:rPr lang="en-US" smtClean="0"/>
+              <a:t>Image plane</a:t>
+            </a:r>
+            <a:endParaRPr lang="en-US"/>
+          </a:p>
+        </p:txBody>
+      </p:sp>
+      <p:cxnSp>
+        <p:nvCxnSpPr>
+          <p:cNvPr id="71" name="Straight Connector 70"/>
+          <p:cNvCxnSpPr/>
+          <p:nvPr/>
+        </p:nvCxnSpPr>
+        <p:spPr>
+          <a:xfrm flipV="1">
+            <a:off x="1205132" y="3733800"/>
+            <a:ext cx="4967068" cy="1648264"/>
+          </a:xfrm>
+          <a:prstGeom prst="line">
+            <a:avLst/>
+          </a:prstGeom>
+          <a:ln>
+            <a:headEnd type="none" w="med" len="med"/>
+            <a:tailEnd type="none" w="med" len="med"/>
+          </a:ln>
+        </p:spPr>
+        <p:style>
+          <a:lnRef idx="2">
+            <a:schemeClr val="dk1"/>
+          </a:lnRef>
+          <a:fillRef idx="0">
+            <a:schemeClr val="dk1"/>
+          </a:fillRef>
+          <a:effectRef idx="1">
+            <a:schemeClr val="dk1"/>
+          </a:effectRef>
+          <a:fontRef idx="minor">
+            <a:schemeClr val="tx1"/>
+          </a:fontRef>
+        </p:style>
+      </p:cxnSp>
+      <p:sp>
+        <p:nvSpPr>
+          <p:cNvPr id="92" name="Cube 91"/>
+          <p:cNvSpPr/>
+          <p:nvPr/>
+        </p:nvSpPr>
+        <p:spPr>
+          <a:xfrm rot="20379979">
+            <a:off x="7186760" y="2827746"/>
+            <a:ext cx="609600" cy="685800"/>
+          </a:xfrm>
+          <a:prstGeom prst="cube">
+            <a:avLst/>
+          </a:prstGeom>
+        </p:spPr>
+        <p:style>
+          <a:lnRef idx="2">
+            <a:schemeClr val="accent1"/>
+          </a:lnRef>
+          <a:fillRef idx="1">
+            <a:schemeClr val="lt1"/>
+          </a:fillRef>
+          <a:effectRef idx="0">
+            <a:schemeClr val="accent1"/>
+          </a:effectRef>
+          <a:fontRef idx="minor">
+            <a:schemeClr val="dk1"/>
+          </a:fontRef>
+        </p:style>
+        <p:txBody>
+          <a:bodyPr rtlCol="0" anchor="ctr"/>
+          <a:lstStyle/>
+          <a:p>
+            <a:pPr algn="ctr"/>
+            <a:endParaRPr lang="en-US"/>
+          </a:p>
+        </p:txBody>
+      </p:sp>
+      <p:cxnSp>
+        <p:nvCxnSpPr>
+          <p:cNvPr id="93" name="Straight Connector 92"/>
+          <p:cNvCxnSpPr>
+            <a:stCxn id="68" idx="5"/>
+          </p:cNvCxnSpPr>
+          <p:nvPr/>
+        </p:nvCxnSpPr>
+        <p:spPr>
+          <a:xfrm flipV="1">
+            <a:off x="6781800" y="3276600"/>
+            <a:ext cx="685800" cy="200025"/>
+          </a:xfrm>
+          <a:prstGeom prst="line">
+            <a:avLst/>
+          </a:prstGeom>
+          <a:ln>
+            <a:headEnd type="none" w="med" len="med"/>
+            <a:tailEnd type="none" w="med" len="med"/>
+          </a:ln>
+        </p:spPr>
+        <p:style>
+          <a:lnRef idx="2">
+            <a:schemeClr val="dk1"/>
+          </a:lnRef>
+          <a:fillRef idx="0">
+            <a:schemeClr val="dk1"/>
+          </a:fillRef>
+          <a:effectRef idx="1">
+            <a:schemeClr val="dk1"/>
+          </a:effectRef>
+          <a:fontRef idx="minor">
+            <a:schemeClr val="tx1"/>
+          </a:fontRef>
+        </p:style>
+      </p:cxnSp>
     </p:spTree>
   </p:cSld>
   <p:clrMapOvr>

</xml_diff>